<commit_message>
sudah di update pak
</commit_message>
<xml_diff>
--- a/laporan/PPT Pemograman dasar_KEL1_XDKVB.pptx
+++ b/laporan/PPT Pemograman dasar_KEL1_XDKVB.pptx
@@ -1,23 +1,25 @@
 
 <file path=ppt/presentation.xml><?xml version="1.0" encoding="utf-8"?>
-<p:presentation xmlns:a="http://schemas.openxmlformats.org/drawingml/2006/main" xmlns:r="http://schemas.openxmlformats.org/officeDocument/2006/relationships" xmlns:p="http://schemas.openxmlformats.org/presentationml/2006/main" removePersonalInfoOnSave="1" saveSubsetFonts="1" autoCompressPictures="0">
+<p:presentation xmlns:a="http://schemas.openxmlformats.org/drawingml/2006/main" xmlns:r="http://schemas.openxmlformats.org/officeDocument/2006/relationships" xmlns:p="http://schemas.openxmlformats.org/presentationml/2006/main" saveSubsetFonts="1" autoCompressPictures="0">
   <p:sldMasterIdLst>
     <p:sldMasterId id="2147483648" r:id="rId4"/>
   </p:sldMasterIdLst>
   <p:notesMasterIdLst>
-    <p:notesMasterId r:id="rId12"/>
+    <p:notesMasterId r:id="rId14"/>
   </p:notesMasterIdLst>
   <p:handoutMasterIdLst>
-    <p:handoutMasterId r:id="rId13"/>
+    <p:handoutMasterId r:id="rId15"/>
   </p:handoutMasterIdLst>
   <p:sldIdLst>
     <p:sldId id="2524" r:id="rId5"/>
     <p:sldId id="2469" r:id="rId6"/>
     <p:sldId id="2531" r:id="rId7"/>
-    <p:sldId id="2536" r:id="rId8"/>
-    <p:sldId id="2532" r:id="rId9"/>
-    <p:sldId id="2537" r:id="rId10"/>
-    <p:sldId id="2534" r:id="rId11"/>
+    <p:sldId id="2534" r:id="rId8"/>
+    <p:sldId id="2536" r:id="rId9"/>
+    <p:sldId id="2532" r:id="rId10"/>
+    <p:sldId id="2538" r:id="rId11"/>
+    <p:sldId id="2539" r:id="rId12"/>
+    <p:sldId id="2540" r:id="rId13"/>
   </p:sldIdLst>
   <p:sldSz cx="12192000" cy="6858000"/>
   <p:notesSz cx="6858000" cy="9144000"/>
@@ -238,7 +240,7 @@
           <a:p>
             <a:fld id="{0248B25D-8766-427E-8C9E-4845048D8DFC}" type="datetimeFigureOut">
               <a:rPr lang="en-US" smtClean="0"/>
-              <a:t>5/21/2025</a:t>
+              <a:t>5/28/2025</a:t>
             </a:fld>
             <a:endParaRPr lang="en-US" dirty="0"/>
           </a:p>
@@ -415,7 +417,7 @@
           <a:p>
             <a:fld id="{426F439B-391B-4B41-826A-951FCF412C34}" type="datetimeFigureOut">
               <a:rPr lang="en-US" smtClean="0"/>
-              <a:t>5/21/2025</a:t>
+              <a:t>5/28/2025</a:t>
             </a:fld>
             <a:endParaRPr lang="en-US" dirty="0"/>
           </a:p>
@@ -5817,7 +5819,7 @@
           </a:ln>
           <a:extLst>
             <a:ext uri="{C572A759-6A51-4108-AA02-DFA0A04FC94B}">
-              <ma14:wrappingTextBoxFlag xmlns:ma14="http://schemas.microsoft.com/office/mac/drawingml/2011/main" xmlns="" val="1"/>
+              <ma14:wrappingTextBoxFlag xmlns="" xmlns:ma14="http://schemas.microsoft.com/office/mac/drawingml/2011/main" val="1"/>
             </a:ext>
           </a:extLst>
         </p:spPr>
@@ -6061,7 +6063,7 @@
           </a:ln>
           <a:extLst>
             <a:ext uri="{C572A759-6A51-4108-AA02-DFA0A04FC94B}">
-              <ma14:wrappingTextBoxFlag xmlns:ma14="http://schemas.microsoft.com/office/mac/drawingml/2011/main" xmlns="" val="1"/>
+              <ma14:wrappingTextBoxFlag xmlns="" xmlns:ma14="http://schemas.microsoft.com/office/mac/drawingml/2011/main" val="1"/>
             </a:ext>
           </a:extLst>
         </p:spPr>
@@ -8197,307 +8199,6 @@
       </p:grpSpPr>
       <p:sp>
         <p:nvSpPr>
-          <p:cNvPr id="2" name="Title 1">
-            <a:extLst>
-              <a:ext uri="{FF2B5EF4-FFF2-40B4-BE49-F238E27FC236}">
-                <a16:creationId xmlns:a16="http://schemas.microsoft.com/office/drawing/2014/main" id="{DFC98A9D-A1C7-35B3-5BE3-28E4AC316469}"/>
-              </a:ext>
-            </a:extLst>
-          </p:cNvPr>
-          <p:cNvSpPr>
-            <a:spLocks noGrp="1"/>
-          </p:cNvSpPr>
-          <p:nvPr>
-            <p:ph type="title"/>
-          </p:nvPr>
-        </p:nvSpPr>
-        <p:spPr/>
-        <p:txBody>
-          <a:bodyPr/>
-          <a:lstStyle/>
-          <a:p>
-            <a:r>
-              <a:rPr lang="id-ID" dirty="0"/>
-              <a:t>HASIL : FROM LOGIN</a:t>
-            </a:r>
-          </a:p>
-        </p:txBody>
-      </p:sp>
-      <p:pic>
-        <p:nvPicPr>
-          <p:cNvPr id="5" name="Content Placeholder 4" descr="A screenshot of a computer&#10;&#10;AI-generated content may be incorrect.">
-            <a:extLst>
-              <a:ext uri="{FF2B5EF4-FFF2-40B4-BE49-F238E27FC236}">
-                <a16:creationId xmlns:a16="http://schemas.microsoft.com/office/drawing/2014/main" id="{6A61CA2C-4753-E2CA-DA76-1CAC2434EEA9}"/>
-              </a:ext>
-            </a:extLst>
-          </p:cNvPr>
-          <p:cNvPicPr>
-            <a:picLocks noGrp="1" noChangeAspect="1"/>
-          </p:cNvPicPr>
-          <p:nvPr>
-            <p:ph idx="1"/>
-          </p:nvPr>
-        </p:nvPicPr>
-        <p:blipFill>
-          <a:blip r:embed="rId2"/>
-          <a:stretch>
-            <a:fillRect/>
-          </a:stretch>
-        </p:blipFill>
-        <p:spPr>
-          <a:xfrm>
-            <a:off x="1890743" y="1825625"/>
-            <a:ext cx="8410514" cy="4351338"/>
-          </a:xfrm>
-        </p:spPr>
-      </p:pic>
-    </p:spTree>
-    <p:extLst>
-      <p:ext uri="{BB962C8B-B14F-4D97-AF65-F5344CB8AC3E}">
-        <p14:creationId xmlns:p14="http://schemas.microsoft.com/office/powerpoint/2010/main" val="1498867984"/>
-      </p:ext>
-    </p:extLst>
-  </p:cSld>
-  <p:clrMapOvr>
-    <a:masterClrMapping/>
-  </p:clrMapOvr>
-</p:sld>
-</file>
-
-<file path=ppt/slides/slide5.xml><?xml version="1.0" encoding="utf-8"?>
-<p:sld xmlns:a="http://schemas.openxmlformats.org/drawingml/2006/main" xmlns:r="http://schemas.openxmlformats.org/officeDocument/2006/relationships" xmlns:p="http://schemas.openxmlformats.org/presentationml/2006/main">
-  <p:cSld>
-    <p:spTree>
-      <p:nvGrpSpPr>
-        <p:cNvPr id="1" name=""/>
-        <p:cNvGrpSpPr/>
-        <p:nvPr/>
-      </p:nvGrpSpPr>
-      <p:grpSpPr>
-        <a:xfrm>
-          <a:off x="0" y="0"/>
-          <a:ext cx="0" cy="0"/>
-          <a:chOff x="0" y="0"/>
-          <a:chExt cx="0" cy="0"/>
-        </a:xfrm>
-      </p:grpSpPr>
-      <p:sp>
-        <p:nvSpPr>
-          <p:cNvPr id="2" name="Title 1"/>
-          <p:cNvSpPr>
-            <a:spLocks noGrp="1"/>
-          </p:cNvSpPr>
-          <p:nvPr>
-            <p:ph type="title"/>
-          </p:nvPr>
-        </p:nvSpPr>
-        <p:spPr>
-          <a:xfrm>
-            <a:off x="838200" y="0"/>
-            <a:ext cx="10515600" cy="1325563"/>
-          </a:xfrm>
-        </p:spPr>
-        <p:txBody>
-          <a:bodyPr/>
-          <a:lstStyle/>
-          <a:p>
-            <a:r>
-              <a:rPr lang="en-US" dirty="0"/>
-              <a:t>HASIL:</a:t>
-            </a:r>
-            <a:r>
-              <a:rPr lang="id-ID" dirty="0"/>
-              <a:t> LANDING PAGE</a:t>
-            </a:r>
-            <a:endParaRPr lang="en-US" dirty="0"/>
-          </a:p>
-        </p:txBody>
-      </p:sp>
-      <p:pic>
-        <p:nvPicPr>
-          <p:cNvPr id="4" name="Content Placeholder 3"/>
-          <p:cNvPicPr>
-            <a:picLocks noGrp="1" noChangeAspect="1"/>
-          </p:cNvPicPr>
-          <p:nvPr>
-            <p:ph idx="1"/>
-          </p:nvPr>
-        </p:nvPicPr>
-        <p:blipFill>
-          <a:blip r:embed="rId2">
-            <a:extLst>
-              <a:ext uri="{28A0092B-C50C-407E-A947-70E740481C1C}">
-                <a14:useLocalDpi xmlns:a14="http://schemas.microsoft.com/office/drawing/2010/main" val="0"/>
-              </a:ext>
-            </a:extLst>
-          </a:blip>
-          <a:stretch>
-            <a:fillRect/>
-          </a:stretch>
-        </p:blipFill>
-        <p:spPr>
-          <a:xfrm>
-            <a:off x="1995485" y="1444181"/>
-            <a:ext cx="7902494" cy="4273781"/>
-          </a:xfrm>
-        </p:spPr>
-      </p:pic>
-      <p:pic>
-        <p:nvPicPr>
-          <p:cNvPr id="5" name="Picture 4"/>
-          <p:cNvPicPr>
-            <a:picLocks noChangeAspect="1"/>
-          </p:cNvPicPr>
-          <p:nvPr/>
-        </p:nvPicPr>
-        <p:blipFill>
-          <a:blip r:embed="rId3">
-            <a:extLst>
-              <a:ext uri="{28A0092B-C50C-407E-A947-70E740481C1C}">
-                <a14:useLocalDpi xmlns:a14="http://schemas.microsoft.com/office/drawing/2010/main" val="0"/>
-              </a:ext>
-            </a:extLst>
-          </a:blip>
-          <a:stretch>
-            <a:fillRect/>
-          </a:stretch>
-        </p:blipFill>
-        <p:spPr>
-          <a:xfrm rot="16200000">
-            <a:off x="-1155884" y="4619656"/>
-            <a:ext cx="3324942" cy="638175"/>
-          </a:xfrm>
-          <a:prstGeom prst="rect">
-            <a:avLst/>
-          </a:prstGeom>
-        </p:spPr>
-      </p:pic>
-    </p:spTree>
-    <p:extLst>
-      <p:ext uri="{BB962C8B-B14F-4D97-AF65-F5344CB8AC3E}">
-        <p14:creationId xmlns:p14="http://schemas.microsoft.com/office/powerpoint/2010/main" val="3925781767"/>
-      </p:ext>
-    </p:extLst>
-  </p:cSld>
-  <p:clrMapOvr>
-    <a:masterClrMapping/>
-  </p:clrMapOvr>
-  <p:transition spd="slow">
-    <p:wipe/>
-  </p:transition>
-</p:sld>
-</file>
-
-<file path=ppt/slides/slide6.xml><?xml version="1.0" encoding="utf-8"?>
-<p:sld xmlns:a="http://schemas.openxmlformats.org/drawingml/2006/main" xmlns:r="http://schemas.openxmlformats.org/officeDocument/2006/relationships" xmlns:p="http://schemas.openxmlformats.org/presentationml/2006/main">
-  <p:cSld>
-    <p:spTree>
-      <p:nvGrpSpPr>
-        <p:cNvPr id="1" name=""/>
-        <p:cNvGrpSpPr/>
-        <p:nvPr/>
-      </p:nvGrpSpPr>
-      <p:grpSpPr>
-        <a:xfrm>
-          <a:off x="0" y="0"/>
-          <a:ext cx="0" cy="0"/>
-          <a:chOff x="0" y="0"/>
-          <a:chExt cx="0" cy="0"/>
-        </a:xfrm>
-      </p:grpSpPr>
-      <p:sp>
-        <p:nvSpPr>
-          <p:cNvPr id="2" name="Title 1">
-            <a:extLst>
-              <a:ext uri="{FF2B5EF4-FFF2-40B4-BE49-F238E27FC236}">
-                <a16:creationId xmlns:a16="http://schemas.microsoft.com/office/drawing/2014/main" id="{A52DBCF6-7502-A73F-6AD0-EB04EC6DC8F5}"/>
-              </a:ext>
-            </a:extLst>
-          </p:cNvPr>
-          <p:cNvSpPr>
-            <a:spLocks noGrp="1"/>
-          </p:cNvSpPr>
-          <p:nvPr>
-            <p:ph type="title"/>
-          </p:nvPr>
-        </p:nvSpPr>
-        <p:spPr/>
-        <p:txBody>
-          <a:bodyPr>
-            <a:normAutofit/>
-          </a:bodyPr>
-          <a:lstStyle/>
-          <a:p>
-            <a:pPr algn="ctr"/>
-            <a:r>
-              <a:rPr lang="id-ID" sz="3200" dirty="0"/>
-              <a:t>KETIKA DI APLIKASIKAN DI MOBILE SIMULATOR</a:t>
-            </a:r>
-          </a:p>
-        </p:txBody>
-      </p:sp>
-      <p:pic>
-        <p:nvPicPr>
-          <p:cNvPr id="5" name="Content Placeholder 4" descr="A screen shot of a phone&#10;&#10;AI-generated content may be incorrect.">
-            <a:extLst>
-              <a:ext uri="{FF2B5EF4-FFF2-40B4-BE49-F238E27FC236}">
-                <a16:creationId xmlns:a16="http://schemas.microsoft.com/office/drawing/2014/main" id="{743729E2-94AB-1426-C870-902D44DBC3B4}"/>
-              </a:ext>
-            </a:extLst>
-          </p:cNvPr>
-          <p:cNvPicPr>
-            <a:picLocks noGrp="1" noChangeAspect="1"/>
-          </p:cNvPicPr>
-          <p:nvPr>
-            <p:ph idx="1"/>
-          </p:nvPr>
-        </p:nvPicPr>
-        <p:blipFill>
-          <a:blip r:embed="rId2"/>
-          <a:stretch>
-            <a:fillRect/>
-          </a:stretch>
-        </p:blipFill>
-        <p:spPr>
-          <a:xfrm>
-            <a:off x="1924932" y="1825625"/>
-            <a:ext cx="8342136" cy="4351338"/>
-          </a:xfrm>
-        </p:spPr>
-      </p:pic>
-    </p:spTree>
-    <p:extLst>
-      <p:ext uri="{BB962C8B-B14F-4D97-AF65-F5344CB8AC3E}">
-        <p14:creationId xmlns:p14="http://schemas.microsoft.com/office/powerpoint/2010/main" val="2541951045"/>
-      </p:ext>
-    </p:extLst>
-  </p:cSld>
-  <p:clrMapOvr>
-    <a:masterClrMapping/>
-  </p:clrMapOvr>
-</p:sld>
-</file>
-
-<file path=ppt/slides/slide7.xml><?xml version="1.0" encoding="utf-8"?>
-<p:sld xmlns:a="http://schemas.openxmlformats.org/drawingml/2006/main" xmlns:r="http://schemas.openxmlformats.org/officeDocument/2006/relationships" xmlns:p="http://schemas.openxmlformats.org/presentationml/2006/main">
-  <p:cSld>
-    <p:spTree>
-      <p:nvGrpSpPr>
-        <p:cNvPr id="1" name=""/>
-        <p:cNvGrpSpPr/>
-        <p:nvPr/>
-      </p:nvGrpSpPr>
-      <p:grpSpPr>
-        <a:xfrm>
-          <a:off x="0" y="0"/>
-          <a:ext cx="0" cy="0"/>
-          <a:chOff x="0" y="0"/>
-          <a:chExt cx="0" cy="0"/>
-        </a:xfrm>
-      </p:grpSpPr>
-      <p:sp>
-        <p:nvSpPr>
           <p:cNvPr id="2" name="Title 1"/>
           <p:cNvSpPr>
             <a:spLocks noGrp="1"/>
@@ -9244,6 +8945,627 @@
   <p:transition spd="slow">
     <p:randomBar dir="vert"/>
   </p:transition>
+</p:sld>
+</file>
+
+<file path=ppt/slides/slide5.xml><?xml version="1.0" encoding="utf-8"?>
+<p:sld xmlns:a="http://schemas.openxmlformats.org/drawingml/2006/main" xmlns:r="http://schemas.openxmlformats.org/officeDocument/2006/relationships" xmlns:p="http://schemas.openxmlformats.org/presentationml/2006/main">
+  <p:cSld>
+    <p:spTree>
+      <p:nvGrpSpPr>
+        <p:cNvPr id="1" name=""/>
+        <p:cNvGrpSpPr/>
+        <p:nvPr/>
+      </p:nvGrpSpPr>
+      <p:grpSpPr>
+        <a:xfrm>
+          <a:off x="0" y="0"/>
+          <a:ext cx="0" cy="0"/>
+          <a:chOff x="0" y="0"/>
+          <a:chExt cx="0" cy="0"/>
+        </a:xfrm>
+      </p:grpSpPr>
+      <p:sp>
+        <p:nvSpPr>
+          <p:cNvPr id="2" name="Title 1">
+            <a:extLst>
+              <a:ext uri="{FF2B5EF4-FFF2-40B4-BE49-F238E27FC236}">
+                <a16:creationId xmlns:a16="http://schemas.microsoft.com/office/drawing/2014/main" id="{DFC98A9D-A1C7-35B3-5BE3-28E4AC316469}"/>
+              </a:ext>
+            </a:extLst>
+          </p:cNvPr>
+          <p:cNvSpPr>
+            <a:spLocks noGrp="1"/>
+          </p:cNvSpPr>
+          <p:nvPr>
+            <p:ph type="title"/>
+          </p:nvPr>
+        </p:nvSpPr>
+        <p:spPr/>
+        <p:txBody>
+          <a:bodyPr/>
+          <a:lstStyle/>
+          <a:p>
+            <a:r>
+              <a:rPr lang="id-ID" dirty="0"/>
+              <a:t>HASIL : FROM LOGIN</a:t>
+            </a:r>
+          </a:p>
+        </p:txBody>
+      </p:sp>
+      <p:pic>
+        <p:nvPicPr>
+          <p:cNvPr id="5" name="Content Placeholder 4" descr="A screenshot of a computer&#10;&#10;AI-generated content may be incorrect.">
+            <a:extLst>
+              <a:ext uri="{FF2B5EF4-FFF2-40B4-BE49-F238E27FC236}">
+                <a16:creationId xmlns:a16="http://schemas.microsoft.com/office/drawing/2014/main" id="{6A61CA2C-4753-E2CA-DA76-1CAC2434EEA9}"/>
+              </a:ext>
+            </a:extLst>
+          </p:cNvPr>
+          <p:cNvPicPr>
+            <a:picLocks noGrp="1" noChangeAspect="1"/>
+          </p:cNvPicPr>
+          <p:nvPr>
+            <p:ph idx="1"/>
+          </p:nvPr>
+        </p:nvPicPr>
+        <p:blipFill>
+          <a:blip r:embed="rId2"/>
+          <a:stretch>
+            <a:fillRect/>
+          </a:stretch>
+        </p:blipFill>
+        <p:spPr>
+          <a:xfrm>
+            <a:off x="838200" y="1690688"/>
+            <a:ext cx="7911773" cy="4093305"/>
+          </a:xfrm>
+        </p:spPr>
+      </p:pic>
+      <p:pic>
+        <p:nvPicPr>
+          <p:cNvPr id="7" name="Picture 6" descr="A screen shot of a phone&#10;&#10;AI-generated content may be incorrect.">
+            <a:extLst>
+              <a:ext uri="{FF2B5EF4-FFF2-40B4-BE49-F238E27FC236}">
+                <a16:creationId xmlns:a16="http://schemas.microsoft.com/office/drawing/2014/main" id="{AC4936F6-F2FF-D259-1DBC-2DA3CAED4C7F}"/>
+              </a:ext>
+            </a:extLst>
+          </p:cNvPr>
+          <p:cNvPicPr>
+            <a:picLocks noChangeAspect="1"/>
+          </p:cNvPicPr>
+          <p:nvPr/>
+        </p:nvPicPr>
+        <p:blipFill>
+          <a:blip r:embed="rId3"/>
+          <a:srcRect l="37810" t="10140" r="38389"/>
+          <a:stretch/>
+        </p:blipFill>
+        <p:spPr>
+          <a:xfrm>
+            <a:off x="9011263" y="916530"/>
+            <a:ext cx="2831691" cy="5576345"/>
+          </a:xfrm>
+          <a:prstGeom prst="rect">
+            <a:avLst/>
+          </a:prstGeom>
+        </p:spPr>
+      </p:pic>
+    </p:spTree>
+    <p:extLst>
+      <p:ext uri="{BB962C8B-B14F-4D97-AF65-F5344CB8AC3E}">
+        <p14:creationId xmlns:p14="http://schemas.microsoft.com/office/powerpoint/2010/main" val="1498867984"/>
+      </p:ext>
+    </p:extLst>
+  </p:cSld>
+  <p:clrMapOvr>
+    <a:masterClrMapping/>
+  </p:clrMapOvr>
+</p:sld>
+</file>
+
+<file path=ppt/slides/slide6.xml><?xml version="1.0" encoding="utf-8"?>
+<p:sld xmlns:a="http://schemas.openxmlformats.org/drawingml/2006/main" xmlns:r="http://schemas.openxmlformats.org/officeDocument/2006/relationships" xmlns:p="http://schemas.openxmlformats.org/presentationml/2006/main">
+  <p:cSld>
+    <p:spTree>
+      <p:nvGrpSpPr>
+        <p:cNvPr id="1" name=""/>
+        <p:cNvGrpSpPr/>
+        <p:nvPr/>
+      </p:nvGrpSpPr>
+      <p:grpSpPr>
+        <a:xfrm>
+          <a:off x="0" y="0"/>
+          <a:ext cx="0" cy="0"/>
+          <a:chOff x="0" y="0"/>
+          <a:chExt cx="0" cy="0"/>
+        </a:xfrm>
+      </p:grpSpPr>
+      <p:sp>
+        <p:nvSpPr>
+          <p:cNvPr id="2" name="Title 1"/>
+          <p:cNvSpPr>
+            <a:spLocks noGrp="1"/>
+          </p:cNvSpPr>
+          <p:nvPr>
+            <p:ph type="title"/>
+          </p:nvPr>
+        </p:nvSpPr>
+        <p:spPr>
+          <a:xfrm>
+            <a:off x="838200" y="0"/>
+            <a:ext cx="10515600" cy="1325563"/>
+          </a:xfrm>
+        </p:spPr>
+        <p:txBody>
+          <a:bodyPr/>
+          <a:lstStyle/>
+          <a:p>
+            <a:r>
+              <a:rPr lang="en-US" dirty="0"/>
+              <a:t>HASIL:</a:t>
+            </a:r>
+            <a:r>
+              <a:rPr lang="id-ID" dirty="0"/>
+              <a:t> LANDING PAGE</a:t>
+            </a:r>
+            <a:endParaRPr lang="en-US" dirty="0"/>
+          </a:p>
+        </p:txBody>
+      </p:sp>
+      <p:pic>
+        <p:nvPicPr>
+          <p:cNvPr id="5" name="Picture 4"/>
+          <p:cNvPicPr>
+            <a:picLocks noChangeAspect="1"/>
+          </p:cNvPicPr>
+          <p:nvPr/>
+        </p:nvPicPr>
+        <p:blipFill>
+          <a:blip r:embed="rId2">
+            <a:extLst>
+              <a:ext uri="{28A0092B-C50C-407E-A947-70E740481C1C}">
+                <a14:useLocalDpi xmlns:a14="http://schemas.microsoft.com/office/drawing/2010/main" val="0"/>
+              </a:ext>
+            </a:extLst>
+          </a:blip>
+          <a:stretch>
+            <a:fillRect/>
+          </a:stretch>
+        </p:blipFill>
+        <p:spPr>
+          <a:xfrm rot="16200000">
+            <a:off x="-1155884" y="4619656"/>
+            <a:ext cx="3324942" cy="638175"/>
+          </a:xfrm>
+          <a:prstGeom prst="rect">
+            <a:avLst/>
+          </a:prstGeom>
+        </p:spPr>
+      </p:pic>
+      <p:pic>
+        <p:nvPicPr>
+          <p:cNvPr id="8" name="Content Placeholder 7" descr="A screenshot of a computer&#10;&#10;AI-generated content may be incorrect.">
+            <a:extLst>
+              <a:ext uri="{FF2B5EF4-FFF2-40B4-BE49-F238E27FC236}">
+                <a16:creationId xmlns:a16="http://schemas.microsoft.com/office/drawing/2014/main" id="{A0BA1A97-CC99-D974-74C9-772C20E87552}"/>
+              </a:ext>
+            </a:extLst>
+          </p:cNvPr>
+          <p:cNvPicPr>
+            <a:picLocks noGrp="1" noChangeAspect="1"/>
+          </p:cNvPicPr>
+          <p:nvPr>
+            <p:ph idx="1"/>
+          </p:nvPr>
+        </p:nvPicPr>
+        <p:blipFill>
+          <a:blip r:embed="rId3"/>
+          <a:stretch>
+            <a:fillRect/>
+          </a:stretch>
+        </p:blipFill>
+        <p:spPr>
+          <a:xfrm>
+            <a:off x="644876" y="1814051"/>
+            <a:ext cx="8440738" cy="3920460"/>
+          </a:xfrm>
+        </p:spPr>
+      </p:pic>
+      <p:pic>
+        <p:nvPicPr>
+          <p:cNvPr id="10" name="Picture 9" descr="A cell phone with a picture of food&#10;&#10;AI-generated content may be incorrect.">
+            <a:extLst>
+              <a:ext uri="{FF2B5EF4-FFF2-40B4-BE49-F238E27FC236}">
+                <a16:creationId xmlns:a16="http://schemas.microsoft.com/office/drawing/2014/main" id="{06239266-EEC0-B67D-1749-539FF4D878CB}"/>
+              </a:ext>
+            </a:extLst>
+          </p:cNvPr>
+          <p:cNvPicPr>
+            <a:picLocks noChangeAspect="1"/>
+          </p:cNvPicPr>
+          <p:nvPr/>
+        </p:nvPicPr>
+        <p:blipFill>
+          <a:blip r:embed="rId4"/>
+          <a:stretch>
+            <a:fillRect/>
+          </a:stretch>
+        </p:blipFill>
+        <p:spPr>
+          <a:xfrm>
+            <a:off x="9251392" y="728285"/>
+            <a:ext cx="2753109" cy="5401429"/>
+          </a:xfrm>
+          <a:prstGeom prst="rect">
+            <a:avLst/>
+          </a:prstGeom>
+        </p:spPr>
+      </p:pic>
+    </p:spTree>
+    <p:extLst>
+      <p:ext uri="{BB962C8B-B14F-4D97-AF65-F5344CB8AC3E}">
+        <p14:creationId xmlns:p14="http://schemas.microsoft.com/office/powerpoint/2010/main" val="3925781767"/>
+      </p:ext>
+    </p:extLst>
+  </p:cSld>
+  <p:clrMapOvr>
+    <a:masterClrMapping/>
+  </p:clrMapOvr>
+  <p:transition spd="slow">
+    <p:wipe/>
+  </p:transition>
+</p:sld>
+</file>
+
+<file path=ppt/slides/slide7.xml><?xml version="1.0" encoding="utf-8"?>
+<p:sld xmlns:a="http://schemas.openxmlformats.org/drawingml/2006/main" xmlns:r="http://schemas.openxmlformats.org/officeDocument/2006/relationships" xmlns:p="http://schemas.openxmlformats.org/presentationml/2006/main">
+  <p:cSld>
+    <p:spTree>
+      <p:nvGrpSpPr>
+        <p:cNvPr id="1" name=""/>
+        <p:cNvGrpSpPr/>
+        <p:nvPr/>
+      </p:nvGrpSpPr>
+      <p:grpSpPr>
+        <a:xfrm>
+          <a:off x="0" y="0"/>
+          <a:ext cx="0" cy="0"/>
+          <a:chOff x="0" y="0"/>
+          <a:chExt cx="0" cy="0"/>
+        </a:xfrm>
+      </p:grpSpPr>
+      <p:sp>
+        <p:nvSpPr>
+          <p:cNvPr id="2" name="Title 1">
+            <a:extLst>
+              <a:ext uri="{FF2B5EF4-FFF2-40B4-BE49-F238E27FC236}">
+                <a16:creationId xmlns:a16="http://schemas.microsoft.com/office/drawing/2014/main" id="{2B987D3D-FB4F-8299-8A64-07A909117F54}"/>
+              </a:ext>
+            </a:extLst>
+          </p:cNvPr>
+          <p:cNvSpPr>
+            <a:spLocks noGrp="1"/>
+          </p:cNvSpPr>
+          <p:nvPr>
+            <p:ph type="title"/>
+          </p:nvPr>
+        </p:nvSpPr>
+        <p:spPr/>
+        <p:txBody>
+          <a:bodyPr/>
+          <a:lstStyle/>
+          <a:p>
+            <a:r>
+              <a:rPr lang="id-ID" dirty="0"/>
+              <a:t>TAMPILAN MAKANAN</a:t>
+            </a:r>
+          </a:p>
+        </p:txBody>
+      </p:sp>
+      <p:pic>
+        <p:nvPicPr>
+          <p:cNvPr id="5" name="Content Placeholder 4" descr="A screen shot of a computer&#10;&#10;AI-generated content may be incorrect.">
+            <a:extLst>
+              <a:ext uri="{FF2B5EF4-FFF2-40B4-BE49-F238E27FC236}">
+                <a16:creationId xmlns:a16="http://schemas.microsoft.com/office/drawing/2014/main" id="{C8E59A48-38D9-B2CA-E39B-1F6ABC14B9FC}"/>
+              </a:ext>
+            </a:extLst>
+          </p:cNvPr>
+          <p:cNvPicPr>
+            <a:picLocks noGrp="1" noChangeAspect="1"/>
+          </p:cNvPicPr>
+          <p:nvPr>
+            <p:ph idx="1"/>
+          </p:nvPr>
+        </p:nvPicPr>
+        <p:blipFill>
+          <a:blip r:embed="rId2"/>
+          <a:stretch>
+            <a:fillRect/>
+          </a:stretch>
+        </p:blipFill>
+        <p:spPr>
+          <a:xfrm>
+            <a:off x="838200" y="1909428"/>
+            <a:ext cx="8091761" cy="3728731"/>
+          </a:xfrm>
+        </p:spPr>
+      </p:pic>
+      <p:pic>
+        <p:nvPicPr>
+          <p:cNvPr id="7" name="Picture 6" descr="A screen shot of a phone&#10;&#10;AI-generated content may be incorrect.">
+            <a:extLst>
+              <a:ext uri="{FF2B5EF4-FFF2-40B4-BE49-F238E27FC236}">
+                <a16:creationId xmlns:a16="http://schemas.microsoft.com/office/drawing/2014/main" id="{43412E9B-A995-7B09-8839-3AFA8D57364F}"/>
+              </a:ext>
+            </a:extLst>
+          </p:cNvPr>
+          <p:cNvPicPr>
+            <a:picLocks noChangeAspect="1"/>
+          </p:cNvPicPr>
+          <p:nvPr/>
+        </p:nvPicPr>
+        <p:blipFill>
+          <a:blip r:embed="rId3"/>
+          <a:stretch>
+            <a:fillRect/>
+          </a:stretch>
+        </p:blipFill>
+        <p:spPr>
+          <a:xfrm>
+            <a:off x="9219785" y="1081920"/>
+            <a:ext cx="2972215" cy="5410955"/>
+          </a:xfrm>
+          <a:prstGeom prst="rect">
+            <a:avLst/>
+          </a:prstGeom>
+        </p:spPr>
+      </p:pic>
+    </p:spTree>
+    <p:extLst>
+      <p:ext uri="{BB962C8B-B14F-4D97-AF65-F5344CB8AC3E}">
+        <p14:creationId xmlns:p14="http://schemas.microsoft.com/office/powerpoint/2010/main" val="1706070522"/>
+      </p:ext>
+    </p:extLst>
+  </p:cSld>
+  <p:clrMapOvr>
+    <a:masterClrMapping/>
+  </p:clrMapOvr>
+</p:sld>
+</file>
+
+<file path=ppt/slides/slide8.xml><?xml version="1.0" encoding="utf-8"?>
+<p:sld xmlns:a="http://schemas.openxmlformats.org/drawingml/2006/main" xmlns:r="http://schemas.openxmlformats.org/officeDocument/2006/relationships" xmlns:p="http://schemas.openxmlformats.org/presentationml/2006/main">
+  <p:cSld>
+    <p:spTree>
+      <p:nvGrpSpPr>
+        <p:cNvPr id="1" name=""/>
+        <p:cNvGrpSpPr/>
+        <p:nvPr/>
+      </p:nvGrpSpPr>
+      <p:grpSpPr>
+        <a:xfrm>
+          <a:off x="0" y="0"/>
+          <a:ext cx="0" cy="0"/>
+          <a:chOff x="0" y="0"/>
+          <a:chExt cx="0" cy="0"/>
+        </a:xfrm>
+      </p:grpSpPr>
+      <p:sp>
+        <p:nvSpPr>
+          <p:cNvPr id="2" name="Title 1">
+            <a:extLst>
+              <a:ext uri="{FF2B5EF4-FFF2-40B4-BE49-F238E27FC236}">
+                <a16:creationId xmlns:a16="http://schemas.microsoft.com/office/drawing/2014/main" id="{F7BC6DEF-F937-7C87-23E1-35DD7B1518B6}"/>
+              </a:ext>
+            </a:extLst>
+          </p:cNvPr>
+          <p:cNvSpPr>
+            <a:spLocks noGrp="1"/>
+          </p:cNvSpPr>
+          <p:nvPr>
+            <p:ph type="title"/>
+          </p:nvPr>
+        </p:nvSpPr>
+        <p:spPr/>
+        <p:txBody>
+          <a:bodyPr/>
+          <a:lstStyle/>
+          <a:p>
+            <a:r>
+              <a:rPr lang="id-ID" dirty="0"/>
+              <a:t>TAMPILAN MINUMAN</a:t>
+            </a:r>
+          </a:p>
+        </p:txBody>
+      </p:sp>
+      <p:pic>
+        <p:nvPicPr>
+          <p:cNvPr id="5" name="Content Placeholder 4" descr="A screenshot of a computer&#10;&#10;AI-generated content may be incorrect.">
+            <a:extLst>
+              <a:ext uri="{FF2B5EF4-FFF2-40B4-BE49-F238E27FC236}">
+                <a16:creationId xmlns:a16="http://schemas.microsoft.com/office/drawing/2014/main" id="{91CB931E-0058-1A51-E2E5-2AA9113498D4}"/>
+              </a:ext>
+            </a:extLst>
+          </p:cNvPr>
+          <p:cNvPicPr>
+            <a:picLocks noGrp="1" noChangeAspect="1"/>
+          </p:cNvPicPr>
+          <p:nvPr>
+            <p:ph idx="1"/>
+          </p:nvPr>
+        </p:nvPicPr>
+        <p:blipFill>
+          <a:blip r:embed="rId2"/>
+          <a:stretch>
+            <a:fillRect/>
+          </a:stretch>
+        </p:blipFill>
+        <p:spPr>
+          <a:xfrm>
+            <a:off x="664833" y="1619743"/>
+            <a:ext cx="8427474" cy="3922494"/>
+          </a:xfrm>
+        </p:spPr>
+      </p:pic>
+      <p:pic>
+        <p:nvPicPr>
+          <p:cNvPr id="9" name="Picture 8" descr="A screenshot of a cell phone&#10;&#10;AI-generated content may be incorrect.">
+            <a:extLst>
+              <a:ext uri="{FF2B5EF4-FFF2-40B4-BE49-F238E27FC236}">
+                <a16:creationId xmlns:a16="http://schemas.microsoft.com/office/drawing/2014/main" id="{979EE28D-A3E8-8BD9-1456-C6BCD75934EA}"/>
+              </a:ext>
+            </a:extLst>
+          </p:cNvPr>
+          <p:cNvPicPr>
+            <a:picLocks noChangeAspect="1"/>
+          </p:cNvPicPr>
+          <p:nvPr/>
+        </p:nvPicPr>
+        <p:blipFill>
+          <a:blip r:embed="rId3"/>
+          <a:stretch>
+            <a:fillRect/>
+          </a:stretch>
+        </p:blipFill>
+        <p:spPr>
+          <a:xfrm>
+            <a:off x="9092307" y="818355"/>
+            <a:ext cx="2905530" cy="5525271"/>
+          </a:xfrm>
+          <a:prstGeom prst="rect">
+            <a:avLst/>
+          </a:prstGeom>
+        </p:spPr>
+      </p:pic>
+    </p:spTree>
+    <p:extLst>
+      <p:ext uri="{BB962C8B-B14F-4D97-AF65-F5344CB8AC3E}">
+        <p14:creationId xmlns:p14="http://schemas.microsoft.com/office/powerpoint/2010/main" val="1937093744"/>
+      </p:ext>
+    </p:extLst>
+  </p:cSld>
+  <p:clrMapOvr>
+    <a:masterClrMapping/>
+  </p:clrMapOvr>
+</p:sld>
+</file>
+
+<file path=ppt/slides/slide9.xml><?xml version="1.0" encoding="utf-8"?>
+<p:sld xmlns:a="http://schemas.openxmlformats.org/drawingml/2006/main" xmlns:r="http://schemas.openxmlformats.org/officeDocument/2006/relationships" xmlns:p="http://schemas.openxmlformats.org/presentationml/2006/main">
+  <p:cSld>
+    <p:spTree>
+      <p:nvGrpSpPr>
+        <p:cNvPr id="1" name=""/>
+        <p:cNvGrpSpPr/>
+        <p:nvPr/>
+      </p:nvGrpSpPr>
+      <p:grpSpPr>
+        <a:xfrm>
+          <a:off x="0" y="0"/>
+          <a:ext cx="0" cy="0"/>
+          <a:chOff x="0" y="0"/>
+          <a:chExt cx="0" cy="0"/>
+        </a:xfrm>
+      </p:grpSpPr>
+      <p:sp>
+        <p:nvSpPr>
+          <p:cNvPr id="2" name="Title 1">
+            <a:extLst>
+              <a:ext uri="{FF2B5EF4-FFF2-40B4-BE49-F238E27FC236}">
+                <a16:creationId xmlns:a16="http://schemas.microsoft.com/office/drawing/2014/main" id="{AEB745C3-2D03-B72B-1A08-9EE7E20267B8}"/>
+              </a:ext>
+            </a:extLst>
+          </p:cNvPr>
+          <p:cNvSpPr>
+            <a:spLocks noGrp="1"/>
+          </p:cNvSpPr>
+          <p:nvPr>
+            <p:ph type="title"/>
+          </p:nvPr>
+        </p:nvSpPr>
+        <p:spPr/>
+        <p:txBody>
+          <a:bodyPr/>
+          <a:lstStyle/>
+          <a:p>
+            <a:r>
+              <a:rPr lang="id-ID" dirty="0"/>
+              <a:t>RESEP</a:t>
+            </a:r>
+          </a:p>
+        </p:txBody>
+      </p:sp>
+      <p:pic>
+        <p:nvPicPr>
+          <p:cNvPr id="5" name="Content Placeholder 4" descr="A screenshot of a computer&#10;&#10;AI-generated content may be incorrect.">
+            <a:extLst>
+              <a:ext uri="{FF2B5EF4-FFF2-40B4-BE49-F238E27FC236}">
+                <a16:creationId xmlns:a16="http://schemas.microsoft.com/office/drawing/2014/main" id="{ED3B1E66-63E2-A9C0-29F3-1928180AC87C}"/>
+              </a:ext>
+            </a:extLst>
+          </p:cNvPr>
+          <p:cNvPicPr>
+            <a:picLocks noGrp="1" noChangeAspect="1"/>
+          </p:cNvPicPr>
+          <p:nvPr>
+            <p:ph idx="1"/>
+          </p:nvPr>
+        </p:nvPicPr>
+        <p:blipFill>
+          <a:blip r:embed="rId2"/>
+          <a:stretch>
+            <a:fillRect/>
+          </a:stretch>
+        </p:blipFill>
+        <p:spPr>
+          <a:xfrm>
+            <a:off x="838200" y="1690688"/>
+            <a:ext cx="8431924" cy="3891181"/>
+          </a:xfrm>
+        </p:spPr>
+      </p:pic>
+      <p:pic>
+        <p:nvPicPr>
+          <p:cNvPr id="7" name="Picture 6" descr="A screenshot of a cell phone&#10;&#10;AI-generated content may be incorrect.">
+            <a:extLst>
+              <a:ext uri="{FF2B5EF4-FFF2-40B4-BE49-F238E27FC236}">
+                <a16:creationId xmlns:a16="http://schemas.microsoft.com/office/drawing/2014/main" id="{777C4B1B-3CEC-5D23-A94A-3D447908ABB0}"/>
+              </a:ext>
+            </a:extLst>
+          </p:cNvPr>
+          <p:cNvPicPr>
+            <a:picLocks noChangeAspect="1"/>
+          </p:cNvPicPr>
+          <p:nvPr/>
+        </p:nvPicPr>
+        <p:blipFill>
+          <a:blip r:embed="rId3"/>
+          <a:stretch>
+            <a:fillRect/>
+          </a:stretch>
+        </p:blipFill>
+        <p:spPr>
+          <a:xfrm>
+            <a:off x="9270124" y="1690688"/>
+            <a:ext cx="2808852" cy="4300345"/>
+          </a:xfrm>
+          <a:prstGeom prst="rect">
+            <a:avLst/>
+          </a:prstGeom>
+        </p:spPr>
+      </p:pic>
+    </p:spTree>
+    <p:extLst>
+      <p:ext uri="{BB962C8B-B14F-4D97-AF65-F5344CB8AC3E}">
+        <p14:creationId xmlns:p14="http://schemas.microsoft.com/office/powerpoint/2010/main" val="52687767"/>
+      </p:ext>
+    </p:extLst>
+  </p:cSld>
+  <p:clrMapOvr>
+    <a:masterClrMapping/>
+  </p:clrMapOvr>
 </p:sld>
 </file>
 
@@ -10039,20 +10361,20 @@
 </file>
 
 <file path=customXml/item1.xml><?xml version="1.0" encoding="utf-8"?>
+<p:properties xmlns:p="http://schemas.microsoft.com/office/2006/metadata/properties" xmlns:xsi="http://www.w3.org/2001/XMLSchema-instance" xmlns:pc="http://schemas.microsoft.com/office/infopath/2007/PartnerControls">
+  <documentManagement>
+    <MediaServiceKeyPoints xmlns="71af3243-3dd4-4a8d-8c0d-dd76da1f02a5" xsi:nil="true"/>
+  </documentManagement>
+</p:properties>
+</file>
+
+<file path=customXml/item2.xml><?xml version="1.0" encoding="utf-8"?>
 <?mso-contentType ?>
 <FormTemplates xmlns="http://schemas.microsoft.com/sharepoint/v3/contenttype/forms">
   <Display>DocumentLibraryForm</Display>
   <Edit>DocumentLibraryForm</Edit>
   <New>DocumentLibraryForm</New>
 </FormTemplates>
-</file>
-
-<file path=customXml/item2.xml><?xml version="1.0" encoding="utf-8"?>
-<p:properties xmlns:p="http://schemas.microsoft.com/office/2006/metadata/properties" xmlns:xsi="http://www.w3.org/2001/XMLSchema-instance" xmlns:pc="http://schemas.microsoft.com/office/infopath/2007/PartnerControls">
-  <documentManagement>
-    <MediaServiceKeyPoints xmlns="71af3243-3dd4-4a8d-8c0d-dd76da1f02a5" xsi:nil="true"/>
-  </documentManagement>
-</p:properties>
 </file>
 
 <file path=customXml/item3.xml><?xml version="1.0" encoding="utf-8"?>
@@ -10267,14 +10589,6 @@
 </file>
 
 <file path=customXml/itemProps1.xml><?xml version="1.0" encoding="utf-8"?>
-<ds:datastoreItem xmlns:ds="http://schemas.openxmlformats.org/officeDocument/2006/customXml" ds:itemID="{22A67AA4-7A39-4D54-84CA-5821BEF7F79E}">
-  <ds:schemaRefs>
-    <ds:schemaRef ds:uri="http://schemas.microsoft.com/sharepoint/v3/contenttype/forms"/>
-  </ds:schemaRefs>
-</ds:datastoreItem>
-</file>
-
-<file path=customXml/itemProps2.xml><?xml version="1.0" encoding="utf-8"?>
 <ds:datastoreItem xmlns:ds="http://schemas.openxmlformats.org/officeDocument/2006/customXml" ds:itemID="{29DE6D2A-0A40-4DAB-B8AE-656243D6AB33}">
   <ds:schemaRefs>
     <ds:schemaRef ds:uri="http://schemas.microsoft.com/office/2006/documentManagement/types"/>
@@ -10287,6 +10601,14 @@
     <ds:schemaRef ds:uri="http://schemas.openxmlformats.org/package/2006/metadata/core-properties"/>
     <ds:schemaRef ds:uri="16c05727-aa75-4e4a-9b5f-8a80a1165891"/>
     <ds:schemaRef ds:uri="http://purl.org/dc/dcmitype/"/>
+  </ds:schemaRefs>
+</ds:datastoreItem>
+</file>
+
+<file path=customXml/itemProps2.xml><?xml version="1.0" encoding="utf-8"?>
+<ds:datastoreItem xmlns:ds="http://schemas.openxmlformats.org/officeDocument/2006/customXml" ds:itemID="{22A67AA4-7A39-4D54-84CA-5821BEF7F79E}">
+  <ds:schemaRefs>
+    <ds:schemaRef ds:uri="http://schemas.microsoft.com/sharepoint/v3/contenttype/forms"/>
   </ds:schemaRefs>
 </ds:datastoreItem>
 </file>

</xml_diff>